<commit_message>
Updated slides with comments.
</commit_message>
<xml_diff>
--- a/ASPPRC_presentation.pptx
+++ b/ASPPRC_presentation.pptx
@@ -6,7 +6,7 @@
     <p:sldMasterId id="2147483651" r:id="rId2"/>
   </p:sldMasterIdLst>
   <p:notesMasterIdLst>
-    <p:notesMasterId r:id="rId16"/>
+    <p:notesMasterId r:id="rId17"/>
   </p:notesMasterIdLst>
   <p:sldIdLst>
     <p:sldId id="256" r:id="rId3"/>
@@ -19,9 +19,10 @@
     <p:sldId id="267" r:id="rId10"/>
     <p:sldId id="269" r:id="rId11"/>
     <p:sldId id="265" r:id="rId12"/>
-    <p:sldId id="260" r:id="rId13"/>
-    <p:sldId id="263" r:id="rId14"/>
-    <p:sldId id="270" r:id="rId15"/>
+    <p:sldId id="271" r:id="rId13"/>
+    <p:sldId id="260" r:id="rId14"/>
+    <p:sldId id="263" r:id="rId15"/>
+    <p:sldId id="270" r:id="rId16"/>
   </p:sldIdLst>
   <p:sldSz cx="9144000" cy="6858000" type="screen4x3"/>
   <p:notesSz cx="6980238" cy="9236075"/>
@@ -270,7 +271,7 @@
       </p15:sldGuideLst>
     </p:ext>
     <p:ext uri="http://customooxmlschemas.google.com/">
-      <go:slidesCustomData xmlns="" xmlns:mc="http://schemas.openxmlformats.org/markup-compatibility/2006" xmlns:mv="urn:schemas-microsoft-com:mac:vml" xmlns:c="http://schemas.openxmlformats.org/drawingml/2006/chart" xmlns:dgm="http://schemas.openxmlformats.org/drawingml/2006/diagram" xmlns:o="urn:schemas-microsoft-com:office:office" xmlns:v="urn:schemas-microsoft-com:vml" xmlns:pvml="urn:schemas-microsoft-com:office:powerpoint" xmlns:com="http://schemas.openxmlformats.org/drawingml/2006/compatibility" xmlns:p14="http://schemas.microsoft.com/office/powerpoint/2010/main" xmlns:p15="http://schemas.microsoft.com/office/powerpoint/2012/main" xmlns:ahyp="http://schemas.microsoft.com/office/drawing/2018/hyperlinkcolor" xmlns:go="http://customooxmlschemas.google.com/" r:id="rId17" roundtripDataSignature="AMtx7mgjtTs6nWraxu7zvWRvJn4box+o0w=="/>
+      <go:slidesCustomData xmlns:go="http://customooxmlschemas.google.com/" xmlns:ahyp="http://schemas.microsoft.com/office/drawing/2018/hyperlinkcolor" xmlns:p15="http://schemas.microsoft.com/office/powerpoint/2012/main" xmlns:p14="http://schemas.microsoft.com/office/powerpoint/2010/main" xmlns:com="http://schemas.openxmlformats.org/drawingml/2006/compatibility" xmlns:pvml="urn:schemas-microsoft-com:office:powerpoint" xmlns:v="urn:schemas-microsoft-com:vml" xmlns:o="urn:schemas-microsoft-com:office:office" xmlns:dgm="http://schemas.openxmlformats.org/drawingml/2006/diagram" xmlns:c="http://schemas.openxmlformats.org/drawingml/2006/chart" xmlns:mv="urn:schemas-microsoft-com:mac:vml" xmlns:mc="http://schemas.openxmlformats.org/markup-compatibility/2006" xmlns="" r:id="rId18" roundtripDataSignature="AMtx7mgjtTs6nWraxu7zvWRvJn4box+o0w=="/>
     </p:ext>
   </p:extLst>
 </p:presentation>
@@ -279,6 +280,7 @@
 <file path=ppt/authors.xml><?xml version="1.0" encoding="utf-8"?>
 <p188:authorLst xmlns:a="http://schemas.openxmlformats.org/drawingml/2006/main" xmlns:r="http://schemas.openxmlformats.org/officeDocument/2006/relationships" xmlns:p188="http://schemas.microsoft.com/office/powerpoint/2018/8/main">
   <p188:author id="{DE975211-6454-2622-23DE-C4F228A95BB1}" name="caleb schenck" initials="cs" userId="787946d61a7c1773" providerId="Windows Live"/>
+  <p188:author id="{9B79A112-ABDC-4163-5474-EB7FFBB981EA}" name="Creuziger, Adam Abel (Fed)" initials="CAA(" userId="S::creuzige@nist.gov::f05e7e51-3798-42d1-86d0-478283f802f4" providerId="AD"/>
 </p188:authorLst>
 </file>
 
@@ -286,6 +288,161 @@
 <p:cmAuthorLst xmlns:a="http://schemas.openxmlformats.org/drawingml/2006/main" xmlns:r="http://schemas.openxmlformats.org/officeDocument/2006/relationships" xmlns:p="http://schemas.openxmlformats.org/presentationml/2006/main">
   <p:cmAuthor id="0" name="Christina Ciganik" initials="" lastIdx="2" clrIdx="0"/>
 </p:cmAuthorLst>
+</file>
+
+<file path=ppt/comments/modernComment_100_0.xml><?xml version="1.0" encoding="utf-8"?>
+<p188:cmLst xmlns:a="http://schemas.openxmlformats.org/drawingml/2006/main" xmlns:r="http://schemas.openxmlformats.org/officeDocument/2006/relationships" xmlns:p188="http://schemas.microsoft.com/office/powerpoint/2018/8/main">
+  <p188:cm id="{B5EF6B2B-28A6-294F-AFCC-26C4930A69E7}" authorId="{9B79A112-ABDC-4163-5474-EB7FFBB981EA}" created="2022-03-07T17:59:26.644">
+    <pc:sldMkLst xmlns:pc="http://schemas.microsoft.com/office/powerpoint/2013/main/command">
+      <pc:docMk/>
+      <pc:sldMk cId="0" sldId="256"/>
+    </pc:sldMkLst>
+    <p188:txBody>
+      <a:bodyPr/>
+      <a:lstStyle/>
+      <a:p>
+        <a:r>
+          <a:rPr lang="en-US"/>
+          <a:t>Do you want to include department affiliations?</a:t>
+        </a:r>
+      </a:p>
+    </p188:txBody>
+  </p188:cm>
+</p188:cmLst>
+</file>
+
+<file path=ppt/comments/modernComment_102_0.xml><?xml version="1.0" encoding="utf-8"?>
+<p188:cmLst xmlns:a="http://schemas.openxmlformats.org/drawingml/2006/main" xmlns:r="http://schemas.openxmlformats.org/officeDocument/2006/relationships" xmlns:p188="http://schemas.microsoft.com/office/powerpoint/2018/8/main">
+  <p188:cm id="{A3D0130E-C6A2-034E-A51E-30C313D67702}" authorId="{9B79A112-ABDC-4163-5474-EB7FFBB981EA}" created="2022-03-07T18:00:25.037">
+    <pc:sldMkLst xmlns:pc="http://schemas.microsoft.com/office/powerpoint/2013/main/command">
+      <pc:docMk/>
+      <pc:sldMk cId="0" sldId="258"/>
+    </pc:sldMkLst>
+    <p188:txBody>
+      <a:bodyPr/>
+      <a:lstStyle/>
+      <a:p>
+        <a:r>
+          <a:rPr lang="en-US"/>
+          <a:t>I changed the font size on this a bit, having only one or two words per line seemed a bit hard to read.</a:t>
+        </a:r>
+      </a:p>
+    </p188:txBody>
+  </p188:cm>
+</p188:cmLst>
+</file>
+
+<file path=ppt/comments/modernComment_103_0.xml><?xml version="1.0" encoding="utf-8"?>
+<p188:cmLst xmlns:a="http://schemas.openxmlformats.org/drawingml/2006/main" xmlns:r="http://schemas.openxmlformats.org/officeDocument/2006/relationships" xmlns:p188="http://schemas.microsoft.com/office/powerpoint/2018/8/main">
+  <p188:cm id="{DE1E528F-B28F-0545-92B3-3524345585B7}" authorId="{9B79A112-ABDC-4163-5474-EB7FFBB981EA}" created="2022-03-07T18:01:40.815">
+    <pc:sldMkLst xmlns:pc="http://schemas.microsoft.com/office/powerpoint/2013/main/command">
+      <pc:docMk/>
+      <pc:sldMk cId="0" sldId="259"/>
+    </pc:sldMkLst>
+    <p188:txBody>
+      <a:bodyPr/>
+      <a:lstStyle/>
+      <a:p>
+        <a:r>
+          <a:rPr lang="en-US"/>
+          <a:t>Maybe instead of ‘Cif File’, ‘Crystal Structure’?  Making it more descriptive might help those who don’t know what a CIF file is. + +Also add microstructure as another input</a:t>
+        </a:r>
+      </a:p>
+    </p188:txBody>
+  </p188:cm>
+</p188:cmLst>
+</file>
+
+<file path=ppt/comments/modernComment_109_5BC7156.xml><?xml version="1.0" encoding="utf-8"?>
+<p188:cmLst xmlns:a="http://schemas.openxmlformats.org/drawingml/2006/main" xmlns:r="http://schemas.openxmlformats.org/officeDocument/2006/relationships" xmlns:p188="http://schemas.microsoft.com/office/powerpoint/2018/8/main">
+  <p188:cm id="{7FFE16CA-71D7-104C-9ABB-7D408EB523D6}" authorId="{9B79A112-ABDC-4163-5474-EB7FFBB981EA}" created="2022-03-07T18:12:14.081">
+    <ac:txMkLst xmlns:ac="http://schemas.microsoft.com/office/drawing/2013/main/command">
+      <pc:docMk xmlns:pc="http://schemas.microsoft.com/office/powerpoint/2013/main/command"/>
+      <pc:sldMk xmlns:pc="http://schemas.microsoft.com/office/powerpoint/2013/main/command" cId="96235862" sldId="265"/>
+      <ac:spMk id="3" creationId="{2769F863-4DD1-4D7C-B3D4-4CD6AF1D8EDF}"/>
+      <ac:txMk cp="0" len="198">
+        <ac:context len="417" hash="3237766097"/>
+      </ac:txMk>
+    </ac:txMkLst>
+    <p188:pos x="7954962" y="489776"/>
+    <p188:txBody>
+      <a:bodyPr/>
+      <a:lstStyle/>
+      <a:p>
+        <a:r>
+          <a:rPr lang="en-US"/>
+          <a:t>I think the blue font items are the ones to lead with.  The first black bullet seems like it’s better to just cover on slide 6, texture effects already covered on slide 2, the automatic peak fitting maybe mention in demo?</a:t>
+        </a:r>
+      </a:p>
+    </p188:txBody>
+  </p188:cm>
+</p188:cmLst>
+</file>
+
+<file path=ppt/comments/modernComment_10A_533D5ABE.xml><?xml version="1.0" encoding="utf-8"?>
+<p188:cmLst xmlns:a="http://schemas.openxmlformats.org/drawingml/2006/main" xmlns:r="http://schemas.openxmlformats.org/officeDocument/2006/relationships" xmlns:p188="http://schemas.microsoft.com/office/powerpoint/2018/8/main">
+  <p188:cm id="{750B9238-9ADD-A545-86F4-CC429128BC9B}" authorId="{9B79A112-ABDC-4163-5474-EB7FFBB981EA}" created="2022-03-07T18:03:41.540">
+    <ac:txMkLst xmlns:ac="http://schemas.microsoft.com/office/drawing/2013/main/command">
+      <pc:docMk xmlns:pc="http://schemas.microsoft.com/office/powerpoint/2013/main/command"/>
+      <pc:sldMk xmlns:pc="http://schemas.microsoft.com/office/powerpoint/2013/main/command" cId="1396529854" sldId="266"/>
+      <ac:spMk id="3" creationId="{6235CA03-04DF-4EAB-9019-166C0A999492}"/>
+      <ac:txMk cp="179" len="8">
+        <ac:context len="293" hash="3983543090"/>
+      </ac:txMk>
+    </ac:txMkLst>
+    <p188:pos x="1980047" y="3007508"/>
+    <p188:txBody>
+      <a:bodyPr/>
+      <a:lstStyle/>
+      <a:p>
+        <a:r>
+          <a:rPr lang="en-US"/>
+          <a:t>Rename similar to slide 4</a:t>
+        </a:r>
+      </a:p>
+    </p188:txBody>
+  </p188:cm>
+  <p188:cm id="{85919C5D-DA2D-884D-AC1F-1A10CC3C206E}" authorId="{9B79A112-ABDC-4163-5474-EB7FFBB981EA}" created="2022-03-07T18:04:45.510">
+    <ac:deMkLst xmlns:ac="http://schemas.microsoft.com/office/drawing/2013/main/command">
+      <pc:docMk xmlns:pc="http://schemas.microsoft.com/office/powerpoint/2013/main/command"/>
+      <pc:sldMk xmlns:pc="http://schemas.microsoft.com/office/powerpoint/2013/main/command" cId="1396529854" sldId="266"/>
+      <ac:spMk id="3" creationId="{6235CA03-04DF-4EAB-9019-166C0A999492}"/>
+    </ac:deMkLst>
+    <p188:txBody>
+      <a:bodyPr/>
+      <a:lstStyle/>
+      <a:p>
+        <a:r>
+          <a:rPr lang="en-US"/>
+          <a:t>Also maybe add an input for ‘microstructure’.  That gets at the grains number, interaction volume question</a:t>
+        </a:r>
+      </a:p>
+    </p188:txBody>
+  </p188:cm>
+</p188:cmLst>
+</file>
+
+<file path=ppt/comments/modernComment_10B_268E04F6.xml><?xml version="1.0" encoding="utf-8"?>
+<p188:cmLst xmlns:a="http://schemas.openxmlformats.org/drawingml/2006/main" xmlns:r="http://schemas.openxmlformats.org/officeDocument/2006/relationships" xmlns:p188="http://schemas.microsoft.com/office/powerpoint/2018/8/main">
+  <p188:cm id="{9002536E-0204-1349-829A-9B482630C8E0}" authorId="{9B79A112-ABDC-4163-5474-EB7FFBB981EA}" created="2022-03-07T18:05:48.429">
+    <pc:sldMkLst xmlns:pc="http://schemas.microsoft.com/office/powerpoint/2013/main/command">
+      <pc:docMk/>
+      <pc:sldMk cId="646841590" sldId="267"/>
+    </pc:sldMkLst>
+    <p188:txBody>
+      <a:bodyPr/>
+      <a:lstStyle/>
+      <a:p>
+        <a:r>
+          <a:rPr lang="en-US"/>
+          <a:t>Open to keeping this or including it as part of the demo</a:t>
+        </a:r>
+      </a:p>
+    </p188:txBody>
+  </p188:cm>
+</p188:cmLst>
 </file>
 
 <file path=ppt/comments/modernComment_10C_4108EEA8.xml><?xml version="1.0" encoding="utf-8"?>
@@ -2415,6 +2572,115 @@
 </file>
 
 <file path=ppt/notesSlides/notesSlide6.xml><?xml version="1.0" encoding="utf-8"?>
+<p:notes xmlns:a="http://schemas.openxmlformats.org/drawingml/2006/main" xmlns:r="http://schemas.openxmlformats.org/officeDocument/2006/relationships" xmlns:p="http://schemas.openxmlformats.org/presentationml/2006/main">
+  <p:cSld>
+    <p:spTree>
+      <p:nvGrpSpPr>
+        <p:cNvPr id="1" name=""/>
+        <p:cNvGrpSpPr/>
+        <p:nvPr/>
+      </p:nvGrpSpPr>
+      <p:grpSpPr>
+        <a:xfrm>
+          <a:off x="0" y="0"/>
+          <a:ext cx="0" cy="0"/>
+          <a:chOff x="0" y="0"/>
+          <a:chExt cx="0" cy="0"/>
+        </a:xfrm>
+      </p:grpSpPr>
+      <p:sp>
+        <p:nvSpPr>
+          <p:cNvPr id="2" name="Slide Image Placeholder 1"/>
+          <p:cNvSpPr>
+            <a:spLocks noGrp="1" noRot="1" noChangeAspect="1"/>
+          </p:cNvSpPr>
+          <p:nvPr>
+            <p:ph type="sldImg"/>
+          </p:nvPr>
+        </p:nvSpPr>
+        <p:spPr/>
+      </p:sp>
+      <p:sp>
+        <p:nvSpPr>
+          <p:cNvPr id="3" name="Notes Placeholder 2"/>
+          <p:cNvSpPr>
+            <a:spLocks noGrp="1"/>
+          </p:cNvSpPr>
+          <p:nvPr>
+            <p:ph type="body" idx="1"/>
+          </p:nvPr>
+        </p:nvSpPr>
+        <p:spPr/>
+        <p:txBody>
+          <a:bodyPr/>
+          <a:lstStyle/>
+          <a:p>
+            <a:endParaRPr lang="en-US" dirty="0"/>
+          </a:p>
+        </p:txBody>
+      </p:sp>
+      <p:sp>
+        <p:nvSpPr>
+          <p:cNvPr id="4" name="Slide Number Placeholder 3"/>
+          <p:cNvSpPr>
+            <a:spLocks noGrp="1"/>
+          </p:cNvSpPr>
+          <p:nvPr>
+            <p:ph type="sldNum" idx="12"/>
+          </p:nvPr>
+        </p:nvSpPr>
+        <p:spPr/>
+        <p:txBody>
+          <a:bodyPr/>
+          <a:lstStyle/>
+          <a:p>
+            <a:pPr marL="0" marR="0" lvl="0" indent="0" algn="r" rtl="0">
+              <a:spcBef>
+                <a:spcPts val="0"/>
+              </a:spcBef>
+              <a:spcAft>
+                <a:spcPts val="0"/>
+              </a:spcAft>
+              <a:buNone/>
+            </a:pPr>
+            <a:fld id="{00000000-1234-1234-1234-123412341234}" type="slidenum">
+              <a:rPr lang="en-US" sz="1200" b="0" i="0" u="none" strike="noStrike" cap="none" smtClean="0">
+                <a:solidFill>
+                  <a:schemeClr val="dk1"/>
+                </a:solidFill>
+                <a:latin typeface="Arial"/>
+                <a:ea typeface="Arial"/>
+                <a:cs typeface="Arial"/>
+                <a:sym typeface="Arial"/>
+              </a:rPr>
+              <a:t>9</a:t>
+            </a:fld>
+            <a:endParaRPr lang="en-US" sz="1200" b="0" i="0" u="none" strike="noStrike" cap="none">
+              <a:solidFill>
+                <a:schemeClr val="dk1"/>
+              </a:solidFill>
+              <a:latin typeface="Arial"/>
+              <a:ea typeface="Arial"/>
+              <a:cs typeface="Arial"/>
+              <a:sym typeface="Arial"/>
+            </a:endParaRPr>
+          </a:p>
+        </p:txBody>
+      </p:sp>
+    </p:spTree>
+    <p:extLst>
+      <p:ext uri="{BB962C8B-B14F-4D97-AF65-F5344CB8AC3E}">
+        <p14:creationId xmlns:p14="http://schemas.microsoft.com/office/powerpoint/2010/main" val="361053560"/>
+      </p:ext>
+    </p:extLst>
+  </p:cSld>
+  <p:clrMapOvr>
+    <a:masterClrMapping/>
+  </p:clrMapOvr>
+</p:notes>
+</file>
+
+<file path=ppt/notesSlides/notesSlide7.xml><?xml version="1.0" encoding="utf-8"?>
 <p:notes xmlns:a="http://schemas.openxmlformats.org/drawingml/2006/main" xmlns:r="http://schemas.openxmlformats.org/officeDocument/2006/relationships" xmlns:p="http://schemas.openxmlformats.org/presentationml/2006/main" showMasterSp="0" showMasterPhAnim="0">
   <p:cSld>
     <p:spTree>
@@ -2471,7 +2737,7 @@
             </a:pPr>
             <a:fld id="{00000000-1234-1234-1234-123412341234}" type="slidenum">
               <a:rPr lang="en-US"/>
-              <a:t>11</a:t>
+              <a:t>12</a:t>
             </a:fld>
             <a:endParaRPr/>
           </a:p>
@@ -7728,6 +7994,11 @@
   <p:clrMapOvr>
     <a:masterClrMapping/>
   </p:clrMapOvr>
+  <p:extLst>
+    <p:ext uri="{6950BFC3-D8DA-4A85-94F7-54DA5524770B}">
+      <p188:commentRel xmlns:p188="http://schemas.microsoft.com/office/powerpoint/2018/8/main" r:id="rId3"/>
+    </p:ext>
+  </p:extLst>
 </p:sld>
 </file>
 
@@ -7840,7 +8111,7 @@
                 <a:latin typeface="Times New Roman" panose="02020603050405020304" pitchFamily="18" charset="0"/>
                 <a:cs typeface="Times New Roman" panose="02020603050405020304" pitchFamily="18" charset="0"/>
               </a:rPr>
-              <a:t>Are you interested in this application?</a:t>
+              <a:t>Are you interested in use of this application?</a:t>
             </a:r>
           </a:p>
           <a:p>
@@ -7970,10 +8241,108 @@
   <p:clrMapOvr>
     <a:masterClrMapping/>
   </p:clrMapOvr>
+  <p:extLst>
+    <p:ext uri="{6950BFC3-D8DA-4A85-94F7-54DA5524770B}">
+      <p188:commentRel xmlns:p188="http://schemas.microsoft.com/office/powerpoint/2018/8/main" r:id="rId2"/>
+    </p:ext>
+  </p:extLst>
 </p:sld>
 </file>
 
 <file path=ppt/slides/slide11.xml><?xml version="1.0" encoding="utf-8"?>
+<p:sld xmlns:a="http://schemas.openxmlformats.org/drawingml/2006/main" xmlns:r="http://schemas.openxmlformats.org/officeDocument/2006/relationships" xmlns:p="http://schemas.openxmlformats.org/presentationml/2006/main">
+  <p:cSld>
+    <p:spTree>
+      <p:nvGrpSpPr>
+        <p:cNvPr id="1" name=""/>
+        <p:cNvGrpSpPr/>
+        <p:nvPr/>
+      </p:nvGrpSpPr>
+      <p:grpSpPr>
+        <a:xfrm>
+          <a:off x="0" y="0"/>
+          <a:ext cx="0" cy="0"/>
+          <a:chOff x="0" y="0"/>
+          <a:chExt cx="0" cy="0"/>
+        </a:xfrm>
+      </p:grpSpPr>
+      <p:sp>
+        <p:nvSpPr>
+          <p:cNvPr id="6" name="Title 5">
+            <a:extLst>
+              <a:ext uri="{FF2B5EF4-FFF2-40B4-BE49-F238E27FC236}">
+                <a16:creationId xmlns:a16="http://schemas.microsoft.com/office/drawing/2014/main" id="{2DB992B7-CDDE-AB47-A178-015218D68662}"/>
+              </a:ext>
+            </a:extLst>
+          </p:cNvPr>
+          <p:cNvSpPr>
+            <a:spLocks noGrp="1"/>
+          </p:cNvSpPr>
+          <p:nvPr>
+            <p:ph type="title"/>
+          </p:nvPr>
+        </p:nvSpPr>
+        <p:spPr/>
+        <p:txBody>
+          <a:bodyPr/>
+          <a:lstStyle/>
+          <a:p>
+            <a:endParaRPr lang="en-US"/>
+          </a:p>
+        </p:txBody>
+      </p:sp>
+      <p:sp>
+        <p:nvSpPr>
+          <p:cNvPr id="5" name="Slide Number Placeholder 4">
+            <a:extLst>
+              <a:ext uri="{FF2B5EF4-FFF2-40B4-BE49-F238E27FC236}">
+                <a16:creationId xmlns:a16="http://schemas.microsoft.com/office/drawing/2014/main" id="{5EA7C389-1062-6C49-AB61-58CEB2CF2B02}"/>
+              </a:ext>
+            </a:extLst>
+          </p:cNvPr>
+          <p:cNvSpPr>
+            <a:spLocks noGrp="1"/>
+          </p:cNvSpPr>
+          <p:nvPr>
+            <p:ph type="sldNum" idx="12"/>
+          </p:nvPr>
+        </p:nvSpPr>
+        <p:spPr/>
+        <p:txBody>
+          <a:bodyPr/>
+          <a:lstStyle/>
+          <a:p>
+            <a:pPr marL="0" lvl="0" indent="0" algn="r" rtl="0">
+              <a:spcBef>
+                <a:spcPts val="0"/>
+              </a:spcBef>
+              <a:spcAft>
+                <a:spcPts val="0"/>
+              </a:spcAft>
+              <a:buNone/>
+            </a:pPr>
+            <a:fld id="{00000000-1234-1234-1234-123412341234}" type="slidenum">
+              <a:rPr lang="en-US" smtClean="0"/>
+              <a:t>11</a:t>
+            </a:fld>
+            <a:endParaRPr lang="en-US"/>
+          </a:p>
+        </p:txBody>
+      </p:sp>
+    </p:spTree>
+    <p:extLst>
+      <p:ext uri="{BB962C8B-B14F-4D97-AF65-F5344CB8AC3E}">
+        <p14:creationId xmlns:p14="http://schemas.microsoft.com/office/powerpoint/2010/main" val="3974257869"/>
+      </p:ext>
+    </p:extLst>
+  </p:cSld>
+  <p:clrMapOvr>
+    <a:masterClrMapping/>
+  </p:clrMapOvr>
+</p:sld>
+</file>
+
+<file path=ppt/slides/slide12.xml><?xml version="1.0" encoding="utf-8"?>
 <p:sld xmlns:a="http://schemas.openxmlformats.org/drawingml/2006/main" xmlns:r="http://schemas.openxmlformats.org/officeDocument/2006/relationships" xmlns:p="http://schemas.openxmlformats.org/presentationml/2006/main">
   <p:cSld>
     <p:spTree>
@@ -8156,7 +8525,7 @@
             </a:pPr>
             <a:fld id="{00000000-1234-1234-1234-123412341234}" type="slidenum">
               <a:rPr lang="en-US"/>
-              <a:t>11</a:t>
+              <a:t>12</a:t>
             </a:fld>
             <a:endParaRPr/>
           </a:p>
@@ -8200,7 +8569,7 @@
 </p:sld>
 </file>
 
-<file path=ppt/slides/slide12.xml><?xml version="1.0" encoding="utf-8"?>
+<file path=ppt/slides/slide13.xml><?xml version="1.0" encoding="utf-8"?>
 <p:sld xmlns:a="http://schemas.openxmlformats.org/drawingml/2006/main" xmlns:r="http://schemas.openxmlformats.org/officeDocument/2006/relationships" xmlns:p="http://schemas.openxmlformats.org/presentationml/2006/main">
   <p:cSld>
     <p:spTree>
@@ -8282,7 +8651,7 @@
             </a:pPr>
             <a:fld id="{00000000-1234-1234-1234-123412341234}" type="slidenum">
               <a:rPr lang="en-US" smtClean="0"/>
-              <a:t>12</a:t>
+              <a:t>13</a:t>
             </a:fld>
             <a:endParaRPr lang="en-US"/>
           </a:p>
@@ -8816,7 +9185,7 @@
 </p:sld>
 </file>
 
-<file path=ppt/slides/slide13.xml><?xml version="1.0" encoding="utf-8"?>
+<file path=ppt/slides/slide14.xml><?xml version="1.0" encoding="utf-8"?>
 <p:sld xmlns:a="http://schemas.openxmlformats.org/drawingml/2006/main" xmlns:r="http://schemas.openxmlformats.org/officeDocument/2006/relationships" xmlns:p="http://schemas.openxmlformats.org/presentationml/2006/main">
   <p:cSld>
     <p:spTree>
@@ -8921,7 +9290,7 @@
             </a:pPr>
             <a:fld id="{00000000-1234-1234-1234-123412341234}" type="slidenum">
               <a:rPr lang="en-US" smtClean="0"/>
-              <a:t>13</a:t>
+              <a:t>14</a:t>
             </a:fld>
             <a:endParaRPr lang="en-US"/>
           </a:p>
@@ -9458,7 +9827,7 @@
               <a:buSzPts val="2800"/>
             </a:pPr>
             <a:r>
-              <a:rPr lang="en-US" sz="2800" dirty="0">
+              <a:rPr lang="en-US" sz="2400" dirty="0">
                 <a:latin typeface="Times New Roman" panose="02020603050405020304" pitchFamily="18" charset="0"/>
                 <a:cs typeface="Times New Roman" panose="02020603050405020304" pitchFamily="18" charset="0"/>
               </a:rPr>
@@ -9466,6 +9835,19 @@
             </a:r>
           </a:p>
           <a:p>
+            <a:pPr marL="177800" indent="0">
+              <a:spcBef>
+                <a:spcPts val="0"/>
+              </a:spcBef>
+              <a:buSzPts val="2800"/>
+              <a:buNone/>
+            </a:pPr>
+            <a:endParaRPr lang="en-US" sz="2400" dirty="0">
+              <a:latin typeface="Times New Roman" panose="02020603050405020304" pitchFamily="18" charset="0"/>
+              <a:cs typeface="Times New Roman" panose="02020603050405020304" pitchFamily="18" charset="0"/>
+            </a:endParaRPr>
+          </a:p>
+          <a:p>
             <a:pPr marL="635000" indent="-457200">
               <a:spcBef>
                 <a:spcPts val="0"/>
@@ -9473,7 +9855,7 @@
               <a:buSzPts val="2800"/>
             </a:pPr>
             <a:r>
-              <a:rPr lang="en-US" sz="2800" dirty="0">
+              <a:rPr lang="en-US" sz="2400" dirty="0">
                 <a:latin typeface="Times New Roman" panose="02020603050405020304" pitchFamily="18" charset="0"/>
                 <a:cs typeface="Times New Roman" panose="02020603050405020304" pitchFamily="18" charset="0"/>
               </a:rPr>
@@ -9543,7 +9925,7 @@
           <p:nvPr/>
         </p:nvPicPr>
         <p:blipFill>
-          <a:blip r:embed="rId3"/>
+          <a:blip r:embed="rId4"/>
           <a:stretch>
             <a:fillRect/>
           </a:stretch>
@@ -9563,6 +9945,11 @@
   <p:clrMapOvr>
     <a:masterClrMapping/>
   </p:clrMapOvr>
+  <p:extLst>
+    <p:ext uri="{6950BFC3-D8DA-4A85-94F7-54DA5524770B}">
+      <p188:commentRel xmlns:p188="http://schemas.microsoft.com/office/powerpoint/2018/8/main" r:id="rId3"/>
+    </p:ext>
+  </p:extLst>
 </p:sld>
 </file>
 
@@ -10371,6 +10758,11 @@
   <p:clrMapOvr>
     <a:masterClrMapping/>
   </p:clrMapOvr>
+  <p:extLst>
+    <p:ext uri="{6950BFC3-D8DA-4A85-94F7-54DA5524770B}">
+      <p188:commentRel xmlns:p188="http://schemas.microsoft.com/office/powerpoint/2018/8/main" r:id="rId3"/>
+    </p:ext>
+  </p:extLst>
 </p:sld>
 </file>
 
@@ -10785,15 +11177,26 @@
                 <a:latin typeface="Times New Roman" panose="02020603050405020304" pitchFamily="18" charset="0"/>
                 <a:cs typeface="Times New Roman" panose="02020603050405020304" pitchFamily="18" charset="0"/>
               </a:rPr>
-              <a:t>Number of replicate measurements or samples (often just one each)</a:t>
+              <a:t>Number of replicate measurements or samples</a:t>
             </a:r>
+          </a:p>
+          <a:p>
+            <a:endParaRPr lang="en-US" sz="2400" dirty="0">
+              <a:solidFill>
+                <a:schemeClr val="accent5">
+                  <a:lumMod val="50000"/>
+                </a:schemeClr>
+              </a:solidFill>
+              <a:latin typeface="Times New Roman" panose="02020603050405020304" pitchFamily="18" charset="0"/>
+              <a:cs typeface="Times New Roman" panose="02020603050405020304" pitchFamily="18" charset="0"/>
+            </a:endParaRPr>
           </a:p>
           <a:p>
             <a:pPr marL="114300" indent="0">
               <a:buNone/>
             </a:pPr>
             <a:r>
-              <a:rPr lang="en-US" dirty="0">
+              <a:rPr lang="en-US" sz="2000" dirty="0">
                 <a:solidFill>
                   <a:schemeClr val="tx1"/>
                 </a:solidFill>
@@ -10803,7 +11206,7 @@
               <a:t>*Black – present	     </a:t>
             </a:r>
             <a:r>
-              <a:rPr lang="en-US" dirty="0">
+              <a:rPr lang="en-US" sz="2000" dirty="0">
                 <a:solidFill>
                   <a:schemeClr val="accent6">
                     <a:lumMod val="60000"/>
@@ -10816,7 +11219,7 @@
               <a:t>*Blue – Next	       </a:t>
             </a:r>
             <a:r>
-              <a:rPr lang="en-US" dirty="0">
+              <a:rPr lang="en-US" sz="2000" dirty="0">
                 <a:solidFill>
                   <a:schemeClr val="accent5">
                     <a:lumMod val="50000"/>
@@ -10828,7 +11231,7 @@
               <a:t>*Teal – Future</a:t>
             </a:r>
             <a:r>
-              <a:rPr lang="en-US" sz="2400" dirty="0">
+              <a:rPr lang="en-US" sz="1800" dirty="0">
                 <a:solidFill>
                   <a:schemeClr val="accent5">
                     <a:lumMod val="50000"/>
@@ -10839,7 +11242,7 @@
               </a:rPr>
               <a:t>	</a:t>
             </a:r>
-            <a:endParaRPr lang="en-US" sz="2400" dirty="0">
+            <a:endParaRPr lang="en-US" sz="1800" dirty="0">
               <a:solidFill>
                 <a:schemeClr val="tx1"/>
               </a:solidFill>
@@ -10986,7 +11389,7 @@
                 <a:latin typeface="Times New Roman" panose="02020603050405020304" pitchFamily="18" charset="0"/>
                 <a:cs typeface="Times New Roman" panose="02020603050405020304" pitchFamily="18" charset="0"/>
               </a:rPr>
-              <a:t>Standard intensity vs 2</a:t>
+              <a:t>Intensity vs 2</a:t>
             </a:r>
             <a:r>
               <a:rPr lang="el-GR" i="0" dirty="0">
@@ -11015,21 +11418,11 @@
           <a:p>
             <a:pPr lvl="1"/>
             <a:r>
-              <a:rPr lang="en-US" dirty="0">
-                <a:highlight>
-                  <a:srgbClr val="FFFF00"/>
-                </a:highlight>
-                <a:latin typeface="Times New Roman" panose="02020603050405020304" pitchFamily="18" charset="0"/>
-                <a:cs typeface="Times New Roman" panose="02020603050405020304" pitchFamily="18" charset="0"/>
-              </a:rPr>
-              <a:t>*Need info on this*</a:t>
-            </a:r>
-            <a:r>
               <a:rPr lang="en-US" i="0" dirty="0">
                 <a:latin typeface="Times New Roman" panose="02020603050405020304" pitchFamily="18" charset="0"/>
                 <a:cs typeface="Times New Roman" panose="02020603050405020304" pitchFamily="18" charset="0"/>
               </a:rPr>
-              <a:t>, x-ray source, energy, step size?, etc.</a:t>
+              <a:t>X-ray system configuration, source material, filters, scan type, etc.</a:t>
             </a:r>
             <a:endParaRPr lang="en-US" dirty="0">
               <a:latin typeface="Times New Roman" panose="02020603050405020304" pitchFamily="18" charset="0"/>
@@ -11052,7 +11445,7 @@
                 <a:latin typeface="Times New Roman" panose="02020603050405020304" pitchFamily="18" charset="0"/>
                 <a:cs typeface="Times New Roman" panose="02020603050405020304" pitchFamily="18" charset="0"/>
               </a:rPr>
-              <a:t>Elemental composition and crystallographic information </a:t>
+              <a:t>Crystallographic information, and elemental composition </a:t>
             </a:r>
             <a:r>
               <a:rPr lang="en-US" i="0" dirty="0">
@@ -11115,6 +11508,11 @@
   <p:clrMapOvr>
     <a:masterClrMapping/>
   </p:clrMapOvr>
+  <p:extLst>
+    <p:ext uri="{6950BFC3-D8DA-4A85-94F7-54DA5524770B}">
+      <p188:commentRel xmlns:p188="http://schemas.microsoft.com/office/powerpoint/2018/8/main" r:id="rId2"/>
+    </p:ext>
+  </p:extLst>
 </p:sld>
 </file>
 
@@ -11247,7 +11645,7 @@
           <p:nvPr/>
         </p:nvPicPr>
         <p:blipFill>
-          <a:blip r:embed="rId3"/>
+          <a:blip r:embed="rId4"/>
           <a:stretch>
             <a:fillRect/>
           </a:stretch>
@@ -11272,6 +11670,11 @@
   <p:clrMapOvr>
     <a:masterClrMapping/>
   </p:clrMapOvr>
+  <p:extLst>
+    <p:ext uri="{6950BFC3-D8DA-4A85-94F7-54DA5524770B}">
+      <p188:commentRel xmlns:p188="http://schemas.microsoft.com/office/powerpoint/2018/8/main" r:id="rId3"/>
+    </p:ext>
+  </p:extLst>
 </p:sld>
 </file>
 
@@ -11389,6 +11792,89 @@
               <a:t>9</a:t>
             </a:fld>
             <a:endParaRPr lang="en-US"/>
+          </a:p>
+        </p:txBody>
+      </p:sp>
+      <p:sp>
+        <p:nvSpPr>
+          <p:cNvPr id="5" name="TextBox 4">
+            <a:extLst>
+              <a:ext uri="{FF2B5EF4-FFF2-40B4-BE49-F238E27FC236}">
+                <a16:creationId xmlns:a16="http://schemas.microsoft.com/office/drawing/2014/main" id="{173A8C81-7E88-B648-9963-D8DF055C3929}"/>
+              </a:ext>
+            </a:extLst>
+          </p:cNvPr>
+          <p:cNvSpPr txBox="1"/>
+          <p:nvPr/>
+        </p:nvSpPr>
+        <p:spPr>
+          <a:xfrm>
+            <a:off x="939452" y="2029216"/>
+            <a:ext cx="7484741" cy="1169551"/>
+          </a:xfrm>
+          <a:prstGeom prst="rect">
+            <a:avLst/>
+          </a:prstGeom>
+          <a:noFill/>
+        </p:spPr>
+        <p:txBody>
+          <a:bodyPr wrap="none" rtlCol="0">
+            <a:spAutoFit/>
+          </a:bodyPr>
+          <a:lstStyle/>
+          <a:p>
+            <a:r>
+              <a:rPr lang="en-US" dirty="0"/>
+              <a:t>Outline of topics to cover:</a:t>
+            </a:r>
+          </a:p>
+          <a:p>
+            <a:pPr marL="285750" indent="-285750">
+              <a:buFontTx/>
+              <a:buChar char="-"/>
+            </a:pPr>
+            <a:r>
+              <a:rPr lang="en-US" dirty="0"/>
+              <a:t>App orientation (tabs, buttons, </a:t>
+            </a:r>
+            <a:r>
+              <a:rPr lang="en-US" dirty="0" err="1"/>
+              <a:t>etc</a:t>
+            </a:r>
+            <a:r>
+              <a:rPr lang="en-US" dirty="0"/>
+              <a:t>)</a:t>
+            </a:r>
+          </a:p>
+          <a:p>
+            <a:pPr marL="285750" indent="-285750">
+              <a:buFontTx/>
+              <a:buChar char="-"/>
+            </a:pPr>
+            <a:r>
+              <a:rPr lang="en-US" dirty="0"/>
+              <a:t>Input tab, How to load a file, prebuilt examples</a:t>
+            </a:r>
+          </a:p>
+          <a:p>
+            <a:pPr marL="285750" indent="-285750">
+              <a:buFontTx/>
+              <a:buChar char="-"/>
+            </a:pPr>
+            <a:r>
+              <a:rPr lang="en-US" dirty="0"/>
+              <a:t>Data tab, data plot and fit plot.  Maybe talk a bit about algorithm we’re using to do the fit?</a:t>
+            </a:r>
+          </a:p>
+          <a:p>
+            <a:pPr marL="285750" indent="-285750">
+              <a:buFontTx/>
+              <a:buChar char="-"/>
+            </a:pPr>
+            <a:r>
+              <a:rPr lang="en-US" dirty="0"/>
+              <a:t>Results tab, phase fraction table, uncertainties, expanded data, diagnostic plots</a:t>
+            </a:r>
           </a:p>
         </p:txBody>
       </p:sp>

</xml_diff>